<commit_message>
- In air, any character thats falling of any ground will have an additional time window of ~120ms to jump.   Previously player may have jumped off earlier to avoid falling. Longer jumps are therefore way harder than   it should be. - Decreased horizontal hit speed. - Reduced tile size for performance. - Added music for level 4. - Revised the free entity list to be more stable. Before that, in level 4 in some cases did it lead to entities deleting each other. Not a game breaking bug, but still very not nice. - Made changes to level 3/4 to make it easier and fixed some walls. - Fixed bug where after destroying a barrel underwater, the character would count as if holding a barrel outside water. - Fixed a bug where after switching gravity when holding a barrel requires two taps to throw it. - Fixed a bug where switching gravity while attacking resulted in Croc not being able to use his attack at all.
</commit_message>
<xml_diff>
--- a/assets/manual/crocndoc.pptx
+++ b/assets/manual/crocndoc.pptx
@@ -3039,7 +3039,7 @@
                   <a:srgbClr val="000000"/>
                 </a:solidFill>
               </a:rPr>
-              <a:t>20.05.2025</a:t>
+              <a:t>27.09.2025</a:t>
             </a:fld>
             <a:endParaRPr lang="de-DE" dirty="0">
               <a:solidFill>
@@ -4078,7 +4078,7 @@
                   <a:srgbClr val="000000"/>
                 </a:solidFill>
               </a:rPr>
-              <a:t>20.05.2025</a:t>
+              <a:t>27.09.2025</a:t>
             </a:fld>
             <a:endParaRPr lang="de-DE" dirty="0">
               <a:solidFill>
@@ -6580,7 +6580,7 @@
           <a:p>
             <a:r>
               <a:rPr lang="en-US" sz="1200" dirty="0"/>
-              <a:t>Croc and Doc excel at different tasks. Croc is strong, can dash forward and bite his way through the enemy forces. Doc on the other is small but can fly over large areas void of any safe place to stand on. Well, to the untrained eye it might seem more like gliding. Both characters can be swapped while on ground. Beat the levels and you’ve won the game.</a:t>
+              <a:t>Croc and Doc excel at different tasks. Croc is strong, can dash forward and bite his way through the enemy forces. Doc on the other is small but can fly over large areas void of any safe place to stand on. Well, to the untrained eye it might seem more like gliding. Both characters can be swapped while on ground and if the other character is alive. At the start of each level, only Croc is alive. Beat the levels and you’ve won the game.</a:t>
             </a:r>
           </a:p>
           <a:p>

</xml_diff>